<commit_message>
make rules change exercise more specific
</commit_message>
<xml_diff>
--- a/magnets/slides.pptx
+++ b/magnets/slides.pptx
@@ -5,10 +5,10 @@
     <p:sldMasterId id="2147483648" r:id="rId1"/>
   </p:sldMasterIdLst>
   <p:notesMasterIdLst>
-    <p:notesMasterId r:id="rId38"/>
+    <p:notesMasterId r:id="rId39"/>
   </p:notesMasterIdLst>
   <p:handoutMasterIdLst>
-    <p:handoutMasterId r:id="rId39"/>
+    <p:handoutMasterId r:id="rId40"/>
   </p:handoutMasterIdLst>
   <p:sldIdLst>
     <p:sldId id="261" r:id="rId2"/>
@@ -39,58 +39,59 @@
     <p:sldId id="283" r:id="rId27"/>
     <p:sldId id="284" r:id="rId28"/>
     <p:sldId id="285" r:id="rId29"/>
-    <p:sldId id="286" r:id="rId30"/>
-    <p:sldId id="295" r:id="rId31"/>
-    <p:sldId id="287" r:id="rId32"/>
-    <p:sldId id="288" r:id="rId33"/>
-    <p:sldId id="289" r:id="rId34"/>
-    <p:sldId id="290" r:id="rId35"/>
-    <p:sldId id="291" r:id="rId36"/>
-    <p:sldId id="292" r:id="rId37"/>
+    <p:sldId id="296" r:id="rId30"/>
+    <p:sldId id="297" r:id="rId31"/>
+    <p:sldId id="295" r:id="rId32"/>
+    <p:sldId id="287" r:id="rId33"/>
+    <p:sldId id="288" r:id="rId34"/>
+    <p:sldId id="289" r:id="rId35"/>
+    <p:sldId id="290" r:id="rId36"/>
+    <p:sldId id="291" r:id="rId37"/>
+    <p:sldId id="292" r:id="rId38"/>
   </p:sldIdLst>
   <p:sldSz cx="9144000" cy="5143500" type="screen16x9"/>
   <p:notesSz cx="6858000" cy="9144000"/>
   <p:embeddedFontLst>
     <p:embeddedFont>
       <p:font typeface="APL333" panose="020B0700000202000203" pitchFamily="34" charset="0"/>
-      <p:regular r:id="rId40"/>
+      <p:regular r:id="rId41"/>
     </p:embeddedFont>
     <p:embeddedFont>
       <p:font typeface="APL385 Unicode" panose="020B0709000202000203" pitchFamily="49" charset="0"/>
-      <p:regular r:id="rId41"/>
+      <p:regular r:id="rId42"/>
     </p:embeddedFont>
     <p:embeddedFont>
       <p:font typeface="APL386 Unicode" panose="020B0709000202000203" pitchFamily="50" charset="0"/>
-      <p:regular r:id="rId42"/>
+      <p:regular r:id="rId43"/>
     </p:embeddedFont>
     <p:embeddedFont>
-      <p:font typeface="Atkinson Hyperlegible" pitchFamily="50" charset="0"/>
-      <p:regular r:id="rId43"/>
-      <p:bold r:id="rId44"/>
-      <p:italic r:id="rId45"/>
-      <p:boldItalic r:id="rId46"/>
+      <p:font typeface="Atkinson Hyperlegible" pitchFamily="2" charset="0"/>
+      <p:regular r:id="rId44"/>
+      <p:bold r:id="rId45"/>
+      <p:italic r:id="rId46"/>
+      <p:boldItalic r:id="rId47"/>
     </p:embeddedFont>
     <p:embeddedFont>
       <p:font typeface="Calibri" panose="020F0502020204030204" pitchFamily="34" charset="0"/>
-      <p:regular r:id="rId41"/>
-      <p:bold r:id="rId41"/>
-      <p:italic r:id="rId41"/>
-      <p:boldItalic r:id="rId41"/>
+      <p:regular r:id="rId42"/>
+      <p:bold r:id="rId42"/>
+      <p:italic r:id="rId42"/>
+      <p:boldItalic r:id="rId42"/>
     </p:embeddedFont>
     <p:embeddedFont>
       <p:font typeface="Cambria Math" panose="02040503050406030204" pitchFamily="18" charset="0"/>
-      <p:regular r:id="rId47"/>
+      <p:regular r:id="rId48"/>
     </p:embeddedFont>
     <p:embeddedFont>
       <p:font typeface="Sarabun" panose="00000500000000000000" pitchFamily="2" charset="-34"/>
-      <p:regular r:id="rId48"/>
-      <p:bold r:id="rId49"/>
-      <p:italic r:id="rId50"/>
-      <p:boldItalic r:id="rId51"/>
+      <p:regular r:id="rId49"/>
+      <p:bold r:id="rId50"/>
+      <p:italic r:id="rId51"/>
+      <p:boldItalic r:id="rId52"/>
     </p:embeddedFont>
     <p:embeddedFont>
       <p:font typeface="Wingdings 2" panose="05020102010507070707" pitchFamily="18" charset="2"/>
-      <p:regular r:id="rId41"/>
+      <p:regular r:id="rId42"/>
     </p:embeddedFont>
   </p:embeddedFontLst>
   <p:defaultTextStyle>
@@ -307,7 +308,7 @@
               <a:rPr lang="en-GB" smtClean="0">
                 <a:latin typeface="Sarabun" panose="00000500000000000000" pitchFamily="2" charset="-34"/>
               </a:rPr>
-              <a:t>03/03/2022</a:t>
+              <a:t>04/03/2022</a:t>
             </a:fld>
             <a:endParaRPr lang="en-GB" dirty="0">
               <a:latin typeface="Sarabun" panose="00000500000000000000" pitchFamily="2" charset="-34"/>
@@ -485,7 +486,7 @@
             <a:fld id="{CDEAEF8A-5BB8-41C8-B8C2-160617C17EF4}" type="datetimeFigureOut">
               <a:rPr lang="en-GB" smtClean="0"/>
               <a:pPr/>
-              <a:t>03/03/2022</a:t>
+              <a:t>04/03/2022</a:t>
             </a:fld>
             <a:endParaRPr lang="en-GB" dirty="0"/>
           </a:p>
@@ -11643,8 +11644,8 @@
           </a:p>
         </p:txBody>
       </p:sp>
-      <mc:AlternateContent xmlns:mc="http://schemas.openxmlformats.org/markup-compatibility/2006">
-        <mc:Choice xmlns:a14="http://schemas.microsoft.com/office/drawing/2010/main" Requires="a14">
+      <mc:AlternateContent xmlns:mc="http://schemas.openxmlformats.org/markup-compatibility/2006" xmlns:a14="http://schemas.microsoft.com/office/drawing/2010/main">
+        <mc:Choice Requires="a14">
           <p:sp>
             <p:nvSpPr>
               <p:cNvPr id="3" name="Content Placeholder 2">
@@ -11802,7 +11803,7 @@
             </p:txBody>
           </p:sp>
         </mc:Choice>
-        <mc:Fallback>
+        <mc:Fallback xmlns="">
           <p:sp>
             <p:nvSpPr>
               <p:cNvPr id="3" name="Content Placeholder 2">
@@ -12088,8 +12089,8 @@
           </a:p>
         </p:txBody>
       </p:sp>
-      <mc:AlternateContent xmlns:mc="http://schemas.openxmlformats.org/markup-compatibility/2006">
-        <mc:Choice xmlns:a14="http://schemas.microsoft.com/office/drawing/2010/main" Requires="a14">
+      <mc:AlternateContent xmlns:mc="http://schemas.openxmlformats.org/markup-compatibility/2006" xmlns:a14="http://schemas.microsoft.com/office/drawing/2010/main">
+        <mc:Choice Requires="a14">
           <p:sp>
             <p:nvSpPr>
               <p:cNvPr id="3" name="Content Placeholder 2">
@@ -12305,7 +12306,7 @@
             </p:txBody>
           </p:sp>
         </mc:Choice>
-        <mc:Fallback>
+        <mc:Fallback xmlns="">
           <p:sp>
             <p:nvSpPr>
               <p:cNvPr id="3" name="Content Placeholder 2">
@@ -13972,31 +13973,6 @@
       </p:grpSpPr>
       <p:sp>
         <p:nvSpPr>
-          <p:cNvPr id="2" name="Content Placeholder 1">
-            <a:extLst>
-              <a:ext uri="{FF2B5EF4-FFF2-40B4-BE49-F238E27FC236}">
-                <a16:creationId xmlns:a16="http://schemas.microsoft.com/office/drawing/2014/main" id="{892ABD65-919E-4814-B733-CFE634B47929}"/>
-              </a:ext>
-            </a:extLst>
-          </p:cNvPr>
-          <p:cNvSpPr>
-            <a:spLocks noGrp="1"/>
-          </p:cNvSpPr>
-          <p:nvPr>
-            <p:ph idx="10"/>
-          </p:nvPr>
-        </p:nvSpPr>
-        <p:spPr/>
-        <p:txBody>
-          <a:bodyPr/>
-          <a:lstStyle/>
-          <a:p>
-            <a:endParaRPr lang="en-GB"/>
-          </a:p>
-        </p:txBody>
-      </p:sp>
-      <p:sp>
-        <p:nvSpPr>
           <p:cNvPr id="3" name="Content Placeholder 2">
             <a:extLst>
               <a:ext uri="{FF2B5EF4-FFF2-40B4-BE49-F238E27FC236}">
@@ -14011,42 +13987,70 @@
             <p:ph idx="1"/>
           </p:nvPr>
         </p:nvSpPr>
-        <p:spPr/>
+        <p:spPr>
+          <a:xfrm>
+            <a:off x="323527" y="1264925"/>
+            <a:ext cx="8588125" cy="3242040"/>
+          </a:xfrm>
+        </p:spPr>
         <p:txBody>
-          <a:bodyPr/>
+          <a:bodyPr>
+            <a:normAutofit/>
+          </a:bodyPr>
           <a:lstStyle/>
           <a:p>
             <a:pPr marL="0" indent="0">
               <a:buNone/>
             </a:pPr>
             <a:r>
-              <a:rPr lang="en-GB" dirty="0"/>
-              <a:t>Choose one of the approaches we discussed and implement it to be easy to adjust for as many of the rule changes as you can</a:t>
+              <a:rPr lang="en-GB" sz="1800" dirty="0"/>
+              <a:t>For each of the approaches we have looked at, modify your code to allow the system to be changed:</a:t>
+            </a:r>
+          </a:p>
+          <a:p>
+            <a:r>
+              <a:rPr lang="en-GB" sz="1800" dirty="0"/>
+              <a:t>Interaction constant</a:t>
+            </a:r>
+          </a:p>
+          <a:p>
+            <a:r>
+              <a:rPr lang="en-GB" sz="1800" dirty="0"/>
+              <a:t>Constant external field</a:t>
+            </a:r>
+          </a:p>
+          <a:p>
+            <a:r>
+              <a:rPr lang="en-GB" sz="1800" dirty="0"/>
+              <a:t>Modifiable neighbourhood</a:t>
             </a:r>
           </a:p>
           <a:p>
             <a:pPr marL="0" indent="0">
               <a:buNone/>
             </a:pPr>
-            <a:endParaRPr lang="en-GB" dirty="0"/>
-          </a:p>
-          <a:p>
-            <a:r>
-              <a:rPr lang="en-GB" dirty="0"/>
-              <a:t>Production quality code</a:t>
-            </a:r>
-          </a:p>
-          <a:p>
-            <a:r>
-              <a:rPr lang="en-GB" dirty="0"/>
-              <a:t>Sensible variable names</a:t>
-            </a:r>
-          </a:p>
-          <a:p>
-            <a:r>
-              <a:rPr lang="en-GB" dirty="0"/>
-              <a:t>Comments</a:t>
-            </a:r>
+            <a:endParaRPr lang="en-GB" sz="1800" dirty="0"/>
+          </a:p>
+          <a:p>
+            <a:pPr marL="0" indent="0">
+              <a:buNone/>
+            </a:pPr>
+            <a:r>
+              <a:rPr lang="en-GB" sz="1800" dirty="0"/>
+              <a:t>Which approaches do you find easy to understand? Which are easiest to change?</a:t>
+            </a:r>
+          </a:p>
+          <a:p>
+            <a:pPr marL="0" indent="0">
+              <a:buNone/>
+            </a:pPr>
+            <a:endParaRPr lang="en-GB" sz="1800" dirty="0"/>
+          </a:p>
+          <a:p>
+            <a:pPr marL="0" indent="0">
+              <a:buNone/>
+            </a:pPr>
+            <a:endParaRPr lang="en-GB" sz="1800" dirty="0"/>
           </a:p>
         </p:txBody>
       </p:sp>
@@ -14106,7 +14110,7 @@
     </p:spTree>
     <p:extLst>
       <p:ext uri="{BB962C8B-B14F-4D97-AF65-F5344CB8AC3E}">
-        <p14:creationId xmlns:p14="http://schemas.microsoft.com/office/powerpoint/2010/main" val="3522580269"/>
+        <p14:creationId xmlns:p14="http://schemas.microsoft.com/office/powerpoint/2010/main" val="3821174937"/>
       </p:ext>
     </p:extLst>
   </p:cSld>
@@ -14625,6 +14629,187 @@
       </p:grpSpPr>
       <p:sp>
         <p:nvSpPr>
+          <p:cNvPr id="3" name="Content Placeholder 2">
+            <a:extLst>
+              <a:ext uri="{FF2B5EF4-FFF2-40B4-BE49-F238E27FC236}">
+                <a16:creationId xmlns:a16="http://schemas.microsoft.com/office/drawing/2014/main" id="{01A80D9B-88A4-49D2-B952-98D1708D315C}"/>
+              </a:ext>
+            </a:extLst>
+          </p:cNvPr>
+          <p:cNvSpPr>
+            <a:spLocks noGrp="1"/>
+          </p:cNvSpPr>
+          <p:nvPr>
+            <p:ph idx="1"/>
+          </p:nvPr>
+        </p:nvSpPr>
+        <p:spPr>
+          <a:xfrm>
+            <a:off x="323527" y="1264925"/>
+            <a:ext cx="8588125" cy="3242040"/>
+          </a:xfrm>
+        </p:spPr>
+        <p:txBody>
+          <a:bodyPr>
+            <a:normAutofit lnSpcReduction="10000"/>
+          </a:bodyPr>
+          <a:lstStyle/>
+          <a:p>
+            <a:pPr marL="0" indent="0">
+              <a:buNone/>
+            </a:pPr>
+            <a:r>
+              <a:rPr lang="en-GB" sz="1800" dirty="0"/>
+              <a:t>Consider:</a:t>
+            </a:r>
+          </a:p>
+          <a:p>
+            <a:r>
+              <a:rPr lang="en-GB" sz="1800" dirty="0"/>
+              <a:t>A static neighbourhood (similar to the problem description, Boolean)</a:t>
+            </a:r>
+          </a:p>
+          <a:p>
+            <a:r>
+              <a:rPr lang="en-GB" sz="1800" dirty="0"/>
+              <a:t>A function of position and/or distance relative the "this spin"</a:t>
+            </a:r>
+          </a:p>
+          <a:p>
+            <a:r>
+              <a:rPr lang="en-GB" sz="1800" dirty="0"/>
+              <a:t>How will you represent the neighbourhood influence?</a:t>
+            </a:r>
+          </a:p>
+          <a:p>
+            <a:endParaRPr lang="en-GB" sz="1800" dirty="0"/>
+          </a:p>
+          <a:p>
+            <a:pPr marL="0" indent="0">
+              <a:buNone/>
+            </a:pPr>
+            <a:r>
+              <a:rPr lang="en-GB" sz="1800" dirty="0"/>
+              <a:t>Try to write:</a:t>
+            </a:r>
+          </a:p>
+          <a:p>
+            <a:r>
+              <a:rPr lang="en-GB" sz="1800" dirty="0"/>
+              <a:t>Production quality code</a:t>
+            </a:r>
+          </a:p>
+          <a:p>
+            <a:r>
+              <a:rPr lang="en-GB" sz="1800" dirty="0"/>
+              <a:t>Sensible variable names</a:t>
+            </a:r>
+          </a:p>
+          <a:p>
+            <a:r>
+              <a:rPr lang="en-GB" sz="1800" dirty="0"/>
+              <a:t>Comments</a:t>
+            </a:r>
+          </a:p>
+          <a:p>
+            <a:pPr marL="0" indent="0">
+              <a:buNone/>
+            </a:pPr>
+            <a:endParaRPr lang="en-GB" sz="1800" dirty="0"/>
+          </a:p>
+          <a:p>
+            <a:pPr marL="0" indent="0">
+              <a:buNone/>
+            </a:pPr>
+            <a:endParaRPr lang="en-GB" sz="1800" dirty="0"/>
+          </a:p>
+        </p:txBody>
+      </p:sp>
+      <p:sp>
+        <p:nvSpPr>
+          <p:cNvPr id="4" name="Content Placeholder 3">
+            <a:extLst>
+              <a:ext uri="{FF2B5EF4-FFF2-40B4-BE49-F238E27FC236}">
+                <a16:creationId xmlns:a16="http://schemas.microsoft.com/office/drawing/2014/main" id="{F7F37986-44BB-4691-AC31-143DE6E2402C}"/>
+              </a:ext>
+            </a:extLst>
+          </p:cNvPr>
+          <p:cNvSpPr>
+            <a:spLocks noGrp="1"/>
+          </p:cNvSpPr>
+          <p:nvPr>
+            <p:ph sz="quarter" idx="12"/>
+          </p:nvPr>
+        </p:nvSpPr>
+        <p:spPr/>
+        <p:txBody>
+          <a:bodyPr/>
+          <a:lstStyle/>
+          <a:p>
+            <a:endParaRPr lang="en-GB"/>
+          </a:p>
+        </p:txBody>
+      </p:sp>
+      <p:sp>
+        <p:nvSpPr>
+          <p:cNvPr id="5" name="Title 4">
+            <a:extLst>
+              <a:ext uri="{FF2B5EF4-FFF2-40B4-BE49-F238E27FC236}">
+                <a16:creationId xmlns:a16="http://schemas.microsoft.com/office/drawing/2014/main" id="{75B21E9B-BEA1-4DDC-B659-87561B40965F}"/>
+              </a:ext>
+            </a:extLst>
+          </p:cNvPr>
+          <p:cNvSpPr>
+            <a:spLocks noGrp="1"/>
+          </p:cNvSpPr>
+          <p:nvPr>
+            <p:ph type="title"/>
+          </p:nvPr>
+        </p:nvSpPr>
+        <p:spPr/>
+        <p:txBody>
+          <a:bodyPr/>
+          <a:lstStyle/>
+          <a:p>
+            <a:r>
+              <a:rPr lang="en-GB" dirty="0"/>
+              <a:t>Exercise: Neighbourhood</a:t>
+            </a:r>
+          </a:p>
+        </p:txBody>
+      </p:sp>
+    </p:spTree>
+    <p:extLst>
+      <p:ext uri="{BB962C8B-B14F-4D97-AF65-F5344CB8AC3E}">
+        <p14:creationId xmlns:p14="http://schemas.microsoft.com/office/powerpoint/2010/main" val="171603933"/>
+      </p:ext>
+    </p:extLst>
+  </p:cSld>
+  <p:clrMapOvr>
+    <a:masterClrMapping/>
+  </p:clrMapOvr>
+</p:sld>
+</file>
+
+<file path=ppt/slides/slide31.xml><?xml version="1.0" encoding="utf-8"?>
+<p:sld xmlns:a="http://schemas.openxmlformats.org/drawingml/2006/main" xmlns:r="http://schemas.openxmlformats.org/officeDocument/2006/relationships" xmlns:p="http://schemas.openxmlformats.org/presentationml/2006/main">
+  <p:cSld>
+    <p:spTree>
+      <p:nvGrpSpPr>
+        <p:cNvPr id="1" name=""/>
+        <p:cNvGrpSpPr/>
+        <p:nvPr/>
+      </p:nvGrpSpPr>
+      <p:grpSpPr>
+        <a:xfrm>
+          <a:off x="0" y="0"/>
+          <a:ext cx="0" cy="0"/>
+          <a:chOff x="0" y="0"/>
+          <a:chExt cx="0" cy="0"/>
+        </a:xfrm>
+      </p:grpSpPr>
+      <p:sp>
+        <p:nvSpPr>
           <p:cNvPr id="2" name="Content Placeholder 1">
             <a:extLst>
               <a:ext uri="{FF2B5EF4-FFF2-40B4-BE49-F238E27FC236}">
@@ -14742,7 +14927,7 @@
 </p:sld>
 </file>
 
-<file path=ppt/slides/slide31.xml><?xml version="1.0" encoding="utf-8"?>
+<file path=ppt/slides/slide32.xml><?xml version="1.0" encoding="utf-8"?>
 <p:sld xmlns:a="http://schemas.openxmlformats.org/drawingml/2006/main" xmlns:r="http://schemas.openxmlformats.org/officeDocument/2006/relationships" xmlns:p="http://schemas.openxmlformats.org/presentationml/2006/main">
   <p:cSld>
     <p:spTree>
@@ -15575,7 +15760,7 @@
 </p:sld>
 </file>
 
-<file path=ppt/slides/slide32.xml><?xml version="1.0" encoding="utf-8"?>
+<file path=ppt/slides/slide33.xml><?xml version="1.0" encoding="utf-8"?>
 <p:sld xmlns:a="http://schemas.openxmlformats.org/drawingml/2006/main" xmlns:r="http://schemas.openxmlformats.org/officeDocument/2006/relationships" xmlns:p="http://schemas.openxmlformats.org/presentationml/2006/main">
   <p:cSld>
     <p:spTree>
@@ -15793,7 +15978,7 @@
 </p:sld>
 </file>
 
-<file path=ppt/slides/slide33.xml><?xml version="1.0" encoding="utf-8"?>
+<file path=ppt/slides/slide34.xml><?xml version="1.0" encoding="utf-8"?>
 <p:sld xmlns:a="http://schemas.openxmlformats.org/drawingml/2006/main" xmlns:r="http://schemas.openxmlformats.org/officeDocument/2006/relationships" xmlns:p="http://schemas.openxmlformats.org/presentationml/2006/main">
   <p:cSld>
     <p:spTree>
@@ -15978,7 +16163,7 @@
 </p:sld>
 </file>
 
-<file path=ppt/slides/slide34.xml><?xml version="1.0" encoding="utf-8"?>
+<file path=ppt/slides/slide35.xml><?xml version="1.0" encoding="utf-8"?>
 <p:sld xmlns:a="http://schemas.openxmlformats.org/drawingml/2006/main" xmlns:r="http://schemas.openxmlformats.org/officeDocument/2006/relationships" xmlns:p="http://schemas.openxmlformats.org/presentationml/2006/main">
   <p:cSld>
     <p:spTree>
@@ -16333,7 +16518,7 @@
 </p:sld>
 </file>
 
-<file path=ppt/slides/slide35.xml><?xml version="1.0" encoding="utf-8"?>
+<file path=ppt/slides/slide36.xml><?xml version="1.0" encoding="utf-8"?>
 <p:sld xmlns:a="http://schemas.openxmlformats.org/drawingml/2006/main" xmlns:r="http://schemas.openxmlformats.org/officeDocument/2006/relationships" xmlns:p="http://schemas.openxmlformats.org/presentationml/2006/main">
   <p:cSld>
     <p:spTree>
@@ -16544,7 +16729,7 @@
 </p:sld>
 </file>
 
-<file path=ppt/slides/slide36.xml><?xml version="1.0" encoding="utf-8"?>
+<file path=ppt/slides/slide37.xml><?xml version="1.0" encoding="utf-8"?>
 <p:sld xmlns:a="http://schemas.openxmlformats.org/drawingml/2006/main" xmlns:r="http://schemas.openxmlformats.org/officeDocument/2006/relationships" xmlns:p="http://schemas.openxmlformats.org/presentationml/2006/main">
   <p:cSld>
     <p:spTree>
@@ -20454,8 +20639,8 @@
           <a:chExt cx="0" cy="0"/>
         </a:xfrm>
       </p:grpSpPr>
-      <mc:AlternateContent xmlns:mc="http://schemas.openxmlformats.org/markup-compatibility/2006">
-        <mc:Choice xmlns:a14="http://schemas.microsoft.com/office/drawing/2010/main" Requires="a14">
+      <mc:AlternateContent xmlns:mc="http://schemas.openxmlformats.org/markup-compatibility/2006" xmlns:a14="http://schemas.microsoft.com/office/drawing/2010/main">
+        <mc:Choice Requires="a14">
           <p:sp>
             <p:nvSpPr>
               <p:cNvPr id="3" name="Content Placeholder 2">
@@ -20884,7 +21069,7 @@
             </p:txBody>
           </p:sp>
         </mc:Choice>
-        <mc:Fallback>
+        <mc:Fallback xmlns="">
           <p:sp>
             <p:nvSpPr>
               <p:cNvPr id="3" name="Content Placeholder 2">
@@ -21006,8 +21191,8 @@
           </a:p>
         </p:txBody>
       </p:sp>
-      <mc:AlternateContent xmlns:mc="http://schemas.openxmlformats.org/markup-compatibility/2006">
-        <mc:Choice xmlns:a14="http://schemas.microsoft.com/office/drawing/2010/main" Requires="a14">
+      <mc:AlternateContent xmlns:mc="http://schemas.openxmlformats.org/markup-compatibility/2006" xmlns:a14="http://schemas.microsoft.com/office/drawing/2010/main">
+        <mc:Choice Requires="a14">
           <p:sp>
             <p:nvSpPr>
               <p:cNvPr id="10" name="TextBox 9">
@@ -21173,7 +21358,7 @@
             </p:txBody>
           </p:sp>
         </mc:Choice>
-        <mc:Fallback>
+        <mc:Fallback xmlns="">
           <p:sp>
             <p:nvSpPr>
               <p:cNvPr id="10" name="TextBox 9">

</xml_diff>